<commit_message>
Ajout réflexion sur approches par filtres
</commit_message>
<xml_diff>
--- a/src/restitution/Website Draft.pptx
+++ b/src/restitution/Website Draft.pptx
@@ -105,6 +105,11 @@
       </a:defRPr>
     </a:lvl9pPr>
   </p:defaultTextStyle>
+  <p:extLst>
+    <p:ext uri="{EFAFB233-063F-42B5-8137-9DF3F51BA10A}">
+      <p15:sldGuideLst xmlns:p15="http://schemas.microsoft.com/office/powerpoint/2012/main"/>
+    </p:ext>
+  </p:extLst>
 </p:presentation>
 </file>
 
@@ -257,7 +262,7 @@
           <a:p>
             <a:fld id="{BBB56518-FC5F-4720-9F6E-187469805D3E}" type="datetimeFigureOut">
               <a:rPr lang="en-US" smtClean="0"/>
-              <a:t>3/30/2020</a:t>
+              <a:t>4/4/2020</a:t>
             </a:fld>
             <a:endParaRPr lang="en-US"/>
           </a:p>
@@ -457,7 +462,7 @@
           <a:p>
             <a:fld id="{BBB56518-FC5F-4720-9F6E-187469805D3E}" type="datetimeFigureOut">
               <a:rPr lang="en-US" smtClean="0"/>
-              <a:t>3/30/2020</a:t>
+              <a:t>4/4/2020</a:t>
             </a:fld>
             <a:endParaRPr lang="en-US"/>
           </a:p>
@@ -667,7 +672,7 @@
           <a:p>
             <a:fld id="{BBB56518-FC5F-4720-9F6E-187469805D3E}" type="datetimeFigureOut">
               <a:rPr lang="en-US" smtClean="0"/>
-              <a:t>3/30/2020</a:t>
+              <a:t>4/4/2020</a:t>
             </a:fld>
             <a:endParaRPr lang="en-US"/>
           </a:p>
@@ -867,7 +872,7 @@
           <a:p>
             <a:fld id="{BBB56518-FC5F-4720-9F6E-187469805D3E}" type="datetimeFigureOut">
               <a:rPr lang="en-US" smtClean="0"/>
-              <a:t>3/30/2020</a:t>
+              <a:t>4/4/2020</a:t>
             </a:fld>
             <a:endParaRPr lang="en-US"/>
           </a:p>
@@ -1143,7 +1148,7 @@
           <a:p>
             <a:fld id="{BBB56518-FC5F-4720-9F6E-187469805D3E}" type="datetimeFigureOut">
               <a:rPr lang="en-US" smtClean="0"/>
-              <a:t>3/30/2020</a:t>
+              <a:t>4/4/2020</a:t>
             </a:fld>
             <a:endParaRPr lang="en-US"/>
           </a:p>
@@ -1411,7 +1416,7 @@
           <a:p>
             <a:fld id="{BBB56518-FC5F-4720-9F6E-187469805D3E}" type="datetimeFigureOut">
               <a:rPr lang="en-US" smtClean="0"/>
-              <a:t>3/30/2020</a:t>
+              <a:t>4/4/2020</a:t>
             </a:fld>
             <a:endParaRPr lang="en-US"/>
           </a:p>
@@ -1826,7 +1831,7 @@
           <a:p>
             <a:fld id="{BBB56518-FC5F-4720-9F6E-187469805D3E}" type="datetimeFigureOut">
               <a:rPr lang="en-US" smtClean="0"/>
-              <a:t>3/30/2020</a:t>
+              <a:t>4/4/2020</a:t>
             </a:fld>
             <a:endParaRPr lang="en-US"/>
           </a:p>
@@ -1968,7 +1973,7 @@
           <a:p>
             <a:fld id="{BBB56518-FC5F-4720-9F6E-187469805D3E}" type="datetimeFigureOut">
               <a:rPr lang="en-US" smtClean="0"/>
-              <a:t>3/30/2020</a:t>
+              <a:t>4/4/2020</a:t>
             </a:fld>
             <a:endParaRPr lang="en-US"/>
           </a:p>
@@ -2081,7 +2086,7 @@
           <a:p>
             <a:fld id="{BBB56518-FC5F-4720-9F6E-187469805D3E}" type="datetimeFigureOut">
               <a:rPr lang="en-US" smtClean="0"/>
-              <a:t>3/30/2020</a:t>
+              <a:t>4/4/2020</a:t>
             </a:fld>
             <a:endParaRPr lang="en-US"/>
           </a:p>
@@ -2394,7 +2399,7 @@
           <a:p>
             <a:fld id="{BBB56518-FC5F-4720-9F6E-187469805D3E}" type="datetimeFigureOut">
               <a:rPr lang="en-US" smtClean="0"/>
-              <a:t>3/30/2020</a:t>
+              <a:t>4/4/2020</a:t>
             </a:fld>
             <a:endParaRPr lang="en-US"/>
           </a:p>
@@ -2683,7 +2688,7 @@
           <a:p>
             <a:fld id="{BBB56518-FC5F-4720-9F6E-187469805D3E}" type="datetimeFigureOut">
               <a:rPr lang="en-US" smtClean="0"/>
-              <a:t>3/30/2020</a:t>
+              <a:t>4/4/2020</a:t>
             </a:fld>
             <a:endParaRPr lang="en-US"/>
           </a:p>
@@ -2926,7 +2931,7 @@
           <a:p>
             <a:fld id="{BBB56518-FC5F-4720-9F6E-187469805D3E}" type="datetimeFigureOut">
               <a:rPr lang="en-US" smtClean="0"/>
-              <a:t>3/30/2020</a:t>
+              <a:t>4/4/2020</a:t>
             </a:fld>
             <a:endParaRPr lang="en-US"/>
           </a:p>
@@ -4342,7 +4347,7 @@
         <p:spPr>
           <a:xfrm>
             <a:off x="7218643" y="238037"/>
-            <a:ext cx="1886222" cy="923330"/>
+            <a:ext cx="1853456" cy="369332"/>
           </a:xfrm>
           <a:prstGeom prst="rect">
             <a:avLst/>
@@ -4363,30 +4368,6 @@
               <a:t>Energie</a:t>
             </a:r>
             <a:endParaRPr lang="en-US" dirty="0"/>
-          </a:p>
-          <a:p>
-            <a:r>
-              <a:rPr lang="en-US" dirty="0" err="1"/>
-              <a:t>Nb</a:t>
-            </a:r>
-            <a:r>
-              <a:rPr lang="en-US" dirty="0"/>
-              <a:t> </a:t>
-            </a:r>
-            <a:r>
-              <a:rPr lang="en-US" dirty="0" err="1"/>
-              <a:t>employés</a:t>
-            </a:r>
-            <a:r>
-              <a:rPr lang="en-US" dirty="0"/>
-              <a:t>: XXX</a:t>
-            </a:r>
-          </a:p>
-          <a:p>
-            <a:r>
-              <a:rPr lang="en-US" dirty="0"/>
-              <a:t>CA: XXX</a:t>
-            </a:r>
           </a:p>
         </p:txBody>
       </p:sp>

</xml_diff>